<commit_message>
fixed UI, changed prompts
</commit_message>
<xml_diff>
--- a/ppt-maker/pptx-presentations/modified.pptx
+++ b/ppt-maker/pptx-presentations/modified.pptx
@@ -3883,7 +3883,7 @@
               </a:lnSpc>
             </a:pPr>
             <a:r>
-              <a:t>Diverse range of conflicts faced by Greg and his friends</a:t>
+              <a:t>The complexities of friendships and peer pressure</a:t>
             </a:r>
           </a:p>
         </p:txBody>
@@ -3915,7 +3915,7 @@
               </a:lnSpc>
             </a:pPr>
             <a:r>
-              <a:t>Conflict</a:t>
+              <a:t>Friendship Challenges</a:t>
             </a:r>
           </a:p>
         </p:txBody>
@@ -4267,7 +4267,7 @@
               </a:lnSpc>
             </a:pPr>
             <a:r>
-              <a:t>The use of humor to address real-life situations</a:t>
+              <a:t>Humorous stories that highlight the challenges of youth</a:t>
             </a:r>
           </a:p>
         </p:txBody>
@@ -4299,7 +4299,7 @@
               </a:lnSpc>
             </a:pPr>
             <a:r>
-              <a:t>Humor</a:t>
+              <a:t>Anecdotes of Humor</a:t>
             </a:r>
           </a:p>
         </p:txBody>
@@ -4651,7 +4651,7 @@
               </a:lnSpc>
             </a:pPr>
             <a:r>
-              <a:t>Key takeaways and moral lessons from the story</a:t>
+              <a:t>Growth and lessons learned throughout the book</a:t>
             </a:r>
           </a:p>
         </p:txBody>
@@ -4683,7 +4683,7 @@
               </a:lnSpc>
             </a:pPr>
             <a:r>
-              <a:t>Lessons Learned</a:t>
+              <a:t>Personal Growth</a:t>
             </a:r>
           </a:p>
         </p:txBody>
@@ -5035,7 +5035,7 @@
               </a:lnSpc>
             </a:pPr>
             <a:r>
-              <a:t>Final thoughts on the series and its legacy.</a:t>
+              <a:t>Reflecting on the journey and its implications for young readers.</a:t>
             </a:r>
           </a:p>
         </p:txBody>
@@ -5067,7 +5067,7 @@
               </a:lnSpc>
             </a:pPr>
             <a:r>
-              <a:t>Conclusion</a:t>
+              <a:t>Final Takeaways</a:t>
             </a:r>
           </a:p>
         </p:txBody>
@@ -8486,7 +8486,7 @@
               </a:lnSpc>
             </a:pPr>
             <a:r>
-              <a:t>Overview of the series and its impact on children's literature</a:t>
+              <a:t>Introducing Greg Heffley and his family</a:t>
             </a:r>
           </a:p>
         </p:txBody>
@@ -8518,7 +8518,7 @@
               </a:lnSpc>
             </a:pPr>
             <a:r>
-              <a:t>Introduction</a:t>
+              <a:t>Character Introduction</a:t>
             </a:r>
           </a:p>
         </p:txBody>
@@ -8870,7 +8870,7 @@
               </a:lnSpc>
             </a:pPr>
             <a:r>
-              <a:t>The importance of facing challenges and being honest</a:t>
+              <a:t>Greg's experiences navigating middle school</a:t>
             </a:r>
           </a:p>
         </p:txBody>
@@ -8902,7 +8902,7 @@
               </a:lnSpc>
             </a:pPr>
             <a:r>
-              <a:t>Key Message</a:t>
+              <a:t>School Life</a:t>
             </a:r>
           </a:p>
         </p:txBody>
@@ -9254,7 +9254,7 @@
               </a:lnSpc>
             </a:pPr>
             <a:r>
-              <a:t>Growth of main character Greg Heffley throughout the series</a:t>
+              <a:t>The ups and downs of Greg's relationship with his parents</a:t>
             </a:r>
           </a:p>
         </p:txBody>
@@ -9286,7 +9286,7 @@
               </a:lnSpc>
             </a:pPr>
             <a:r>
-              <a:t>Character Development</a:t>
+              <a:t>Family Dynamics</a:t>
             </a:r>
           </a:p>
         </p:txBody>

</xml_diff>